<commit_message>
Puts in the column names for the first row of heat maps and increases font of the legend
</commit_message>
<xml_diff>
--- a/journal/keynote/all-roles-included/journal-pictures.pptx
+++ b/journal/keynote/all-roles-included/journal-pictures.pptx
@@ -310,7 +310,7 @@
             </a:pPr>
             <a:r>
               <a:rPr sz="25600"/>
-              <a:t>Title Text</a:t>
+              <a:t>Текст заголовка</a:t>
             </a:r>
           </a:p>
         </p:txBody>
@@ -382,7 +382,7 @@
             </a:pPr>
             <a:r>
               <a:rPr sz="10200"/>
-              <a:t>Body Level One</a:t>
+              <a:t>Уровень текста 1</a:t>
             </a:r>
             <a:endParaRPr sz="10200"/>
           </a:p>
@@ -392,7 +392,7 @@
             </a:pPr>
             <a:r>
               <a:rPr sz="10200"/>
-              <a:t>Body Level Two</a:t>
+              <a:t>Уровень текста 2</a:t>
             </a:r>
             <a:endParaRPr sz="10200"/>
           </a:p>
@@ -402,7 +402,7 @@
             </a:pPr>
             <a:r>
               <a:rPr sz="10200"/>
-              <a:t>Body Level Three</a:t>
+              <a:t>Уровень текста 3</a:t>
             </a:r>
             <a:endParaRPr sz="10200"/>
           </a:p>
@@ -412,7 +412,7 @@
             </a:pPr>
             <a:r>
               <a:rPr sz="10200"/>
-              <a:t>Body Level Four</a:t>
+              <a:t>Уровень текста 4</a:t>
             </a:r>
             <a:endParaRPr sz="10200"/>
           </a:p>
@@ -422,7 +422,7 @@
             </a:pPr>
             <a:r>
               <a:rPr sz="10200"/>
-              <a:t>Body Level Five</a:t>
+              <a:t>Уровень текста 5</a:t>
             </a:r>
           </a:p>
         </p:txBody>
@@ -557,7 +557,7 @@
             </a:pPr>
             <a:r>
               <a:rPr sz="25600"/>
-              <a:t>Title Text</a:t>
+              <a:t>Текст заголовка</a:t>
             </a:r>
           </a:p>
         </p:txBody>
@@ -629,7 +629,7 @@
             </a:pPr>
             <a:r>
               <a:rPr sz="10200"/>
-              <a:t>Body Level One</a:t>
+              <a:t>Уровень текста 1</a:t>
             </a:r>
             <a:endParaRPr sz="10200"/>
           </a:p>
@@ -639,7 +639,7 @@
             </a:pPr>
             <a:r>
               <a:rPr sz="10200"/>
-              <a:t>Body Level Two</a:t>
+              <a:t>Уровень текста 2</a:t>
             </a:r>
             <a:endParaRPr sz="10200"/>
           </a:p>
@@ -649,7 +649,7 @@
             </a:pPr>
             <a:r>
               <a:rPr sz="10200"/>
-              <a:t>Body Level Three</a:t>
+              <a:t>Уровень текста 3</a:t>
             </a:r>
             <a:endParaRPr sz="10200"/>
           </a:p>
@@ -659,7 +659,7 @@
             </a:pPr>
             <a:r>
               <a:rPr sz="10200"/>
-              <a:t>Body Level Four</a:t>
+              <a:t>Уровень текста 4</a:t>
             </a:r>
             <a:endParaRPr sz="10200"/>
           </a:p>
@@ -669,7 +669,7 @@
             </a:pPr>
             <a:r>
               <a:rPr sz="10200"/>
-              <a:t>Body Level Five</a:t>
+              <a:t>Уровень текста 5</a:t>
             </a:r>
           </a:p>
         </p:txBody>
@@ -726,7 +726,7 @@
             </a:pPr>
             <a:r>
               <a:rPr sz="25600"/>
-              <a:t>Title Text</a:t>
+              <a:t>Текст заголовка</a:t>
             </a:r>
           </a:p>
         </p:txBody>
@@ -787,7 +787,7 @@
             </a:pPr>
             <a:r>
               <a:rPr sz="19200"/>
-              <a:t>Title Text</a:t>
+              <a:t>Текст заголовка</a:t>
             </a:r>
           </a:p>
         </p:txBody>
@@ -859,7 +859,7 @@
             </a:pPr>
             <a:r>
               <a:rPr sz="10200"/>
-              <a:t>Body Level One</a:t>
+              <a:t>Уровень текста 1</a:t>
             </a:r>
             <a:endParaRPr sz="10200"/>
           </a:p>
@@ -869,7 +869,7 @@
             </a:pPr>
             <a:r>
               <a:rPr sz="10200"/>
-              <a:t>Body Level Two</a:t>
+              <a:t>Уровень текста 2</a:t>
             </a:r>
             <a:endParaRPr sz="10200"/>
           </a:p>
@@ -879,7 +879,7 @@
             </a:pPr>
             <a:r>
               <a:rPr sz="10200"/>
-              <a:t>Body Level Three</a:t>
+              <a:t>Уровень текста 3</a:t>
             </a:r>
             <a:endParaRPr sz="10200"/>
           </a:p>
@@ -889,7 +889,7 @@
             </a:pPr>
             <a:r>
               <a:rPr sz="10200"/>
-              <a:t>Body Level Four</a:t>
+              <a:t>Уровень текста 4</a:t>
             </a:r>
             <a:endParaRPr sz="10200"/>
           </a:p>
@@ -899,7 +899,7 @@
             </a:pPr>
             <a:r>
               <a:rPr sz="10200"/>
-              <a:t>Body Level Five</a:t>
+              <a:t>Уровень текста 5</a:t>
             </a:r>
           </a:p>
         </p:txBody>
@@ -952,7 +952,7 @@
             </a:pPr>
             <a:r>
               <a:rPr sz="25600"/>
-              <a:t>Title Text</a:t>
+              <a:t>Текст заголовка</a:t>
             </a:r>
           </a:p>
         </p:txBody>
@@ -1005,7 +1005,7 @@
             </a:pPr>
             <a:r>
               <a:rPr sz="25600"/>
-              <a:t>Title Text</a:t>
+              <a:t>Текст заголовка</a:t>
             </a:r>
           </a:p>
         </p:txBody>
@@ -1032,7 +1032,7 @@
             </a:pPr>
             <a:r>
               <a:rPr sz="11400"/>
-              <a:t>Body Level One</a:t>
+              <a:t>Уровень текста 1</a:t>
             </a:r>
             <a:endParaRPr sz="11400"/>
           </a:p>
@@ -1042,7 +1042,7 @@
             </a:pPr>
             <a:r>
               <a:rPr sz="11400"/>
-              <a:t>Body Level Two</a:t>
+              <a:t>Уровень текста 2</a:t>
             </a:r>
             <a:endParaRPr sz="11400"/>
           </a:p>
@@ -1052,7 +1052,7 @@
             </a:pPr>
             <a:r>
               <a:rPr sz="11400"/>
-              <a:t>Body Level Three</a:t>
+              <a:t>Уровень текста 3</a:t>
             </a:r>
             <a:endParaRPr sz="11400"/>
           </a:p>
@@ -1062,7 +1062,7 @@
             </a:pPr>
             <a:r>
               <a:rPr sz="11400"/>
-              <a:t>Body Level Four</a:t>
+              <a:t>Уровень текста 4</a:t>
             </a:r>
             <a:endParaRPr sz="11400"/>
           </a:p>
@@ -1072,7 +1072,7 @@
             </a:pPr>
             <a:r>
               <a:rPr sz="11400"/>
-              <a:t>Body Level Five</a:t>
+              <a:t>Уровень текста 5</a:t>
             </a:r>
           </a:p>
         </p:txBody>
@@ -1125,7 +1125,7 @@
             </a:pPr>
             <a:r>
               <a:rPr sz="25600"/>
-              <a:t>Title Text</a:t>
+              <a:t>Текст заголовка</a:t>
             </a:r>
           </a:p>
         </p:txBody>
@@ -1187,7 +1187,7 @@
             </a:pPr>
             <a:r>
               <a:rPr sz="8800"/>
-              <a:t>Body Level One</a:t>
+              <a:t>Уровень текста 1</a:t>
             </a:r>
             <a:endParaRPr sz="8800"/>
           </a:p>
@@ -1197,7 +1197,7 @@
             </a:pPr>
             <a:r>
               <a:rPr sz="8800"/>
-              <a:t>Body Level Two</a:t>
+              <a:t>Уровень текста 2</a:t>
             </a:r>
             <a:endParaRPr sz="8800"/>
           </a:p>
@@ -1207,7 +1207,7 @@
             </a:pPr>
             <a:r>
               <a:rPr sz="8800"/>
-              <a:t>Body Level Three</a:t>
+              <a:t>Уровень текста 3</a:t>
             </a:r>
             <a:endParaRPr sz="8800"/>
           </a:p>
@@ -1217,7 +1217,7 @@
             </a:pPr>
             <a:r>
               <a:rPr sz="8800"/>
-              <a:t>Body Level Four</a:t>
+              <a:t>Уровень текста 4</a:t>
             </a:r>
             <a:endParaRPr sz="8800"/>
           </a:p>
@@ -1227,7 +1227,7 @@
             </a:pPr>
             <a:r>
               <a:rPr sz="8800"/>
-              <a:t>Body Level Five</a:t>
+              <a:t>Уровень текста 5</a:t>
             </a:r>
           </a:p>
         </p:txBody>
@@ -1284,7 +1284,7 @@
             </a:pPr>
             <a:r>
               <a:rPr sz="11400"/>
-              <a:t>Body Level One</a:t>
+              <a:t>Уровень текста 1</a:t>
             </a:r>
             <a:endParaRPr sz="11400"/>
           </a:p>
@@ -1294,7 +1294,7 @@
             </a:pPr>
             <a:r>
               <a:rPr sz="11400"/>
-              <a:t>Body Level Two</a:t>
+              <a:t>Уровень текста 2</a:t>
             </a:r>
             <a:endParaRPr sz="11400"/>
           </a:p>
@@ -1304,7 +1304,7 @@
             </a:pPr>
             <a:r>
               <a:rPr sz="11400"/>
-              <a:t>Body Level Three</a:t>
+              <a:t>Уровень текста 3</a:t>
             </a:r>
             <a:endParaRPr sz="11400"/>
           </a:p>
@@ -1314,7 +1314,7 @@
             </a:pPr>
             <a:r>
               <a:rPr sz="11400"/>
-              <a:t>Body Level Four</a:t>
+              <a:t>Уровень текста 4</a:t>
             </a:r>
             <a:endParaRPr sz="11400"/>
           </a:p>
@@ -1324,7 +1324,7 @@
             </a:pPr>
             <a:r>
               <a:rPr sz="11400"/>
-              <a:t>Body Level Five</a:t>
+              <a:t>Уровень текста 5</a:t>
             </a:r>
           </a:p>
         </p:txBody>
@@ -1424,7 +1424,7 @@
             </a:pPr>
             <a:r>
               <a:rPr sz="25600"/>
-              <a:t>Title Text</a:t>
+              <a:t>Текст заголовка</a:t>
             </a:r>
           </a:p>
         </p:txBody>
@@ -1465,7 +1465,7 @@
             </a:pPr>
             <a:r>
               <a:rPr sz="11400"/>
-              <a:t>Body Level One</a:t>
+              <a:t>Уровень текста 1</a:t>
             </a:r>
             <a:endParaRPr sz="11400"/>
           </a:p>
@@ -1475,7 +1475,7 @@
             </a:pPr>
             <a:r>
               <a:rPr sz="11400"/>
-              <a:t>Body Level Two</a:t>
+              <a:t>Уровень текста 2</a:t>
             </a:r>
             <a:endParaRPr sz="11400"/>
           </a:p>
@@ -1485,7 +1485,7 @@
             </a:pPr>
             <a:r>
               <a:rPr sz="11400"/>
-              <a:t>Body Level Three</a:t>
+              <a:t>Уровень текста 3</a:t>
             </a:r>
             <a:endParaRPr sz="11400"/>
           </a:p>
@@ -1495,7 +1495,7 @@
             </a:pPr>
             <a:r>
               <a:rPr sz="11400"/>
-              <a:t>Body Level Four</a:t>
+              <a:t>Уровень текста 4</a:t>
             </a:r>
             <a:endParaRPr sz="11400"/>
           </a:p>
@@ -1505,7 +1505,7 @@
             </a:pPr>
             <a:r>
               <a:rPr sz="11400"/>
-              <a:t>Body Level Five</a:t>
+              <a:t>Уровень текста 5</a:t>
             </a:r>
           </a:p>
         </p:txBody>
@@ -1846,7 +1846,7 @@
       </p:grpSpPr>
       <p:pic>
         <p:nvPicPr>
-          <p:cNvPr id="32" name="just-sn-ms2.png"/>
+          <p:cNvPr id="32" name="ms2-no-weights.png"/>
           <p:cNvPicPr/>
           <p:nvPr/>
         </p:nvPicPr>
@@ -1854,14 +1854,15 @@
           <a:blip r:embed="rId2">
             <a:extLst/>
           </a:blip>
+          <a:srcRect l="0" t="23441" r="0" b="23441"/>
           <a:stretch>
             <a:fillRect/>
           </a:stretch>
         </p:blipFill>
         <p:spPr>
           <a:xfrm>
-            <a:off x="339088" y="19682195"/>
-            <a:ext cx="16529821" cy="8780068"/>
+            <a:off x="282892" y="20345744"/>
+            <a:ext cx="16529822" cy="8780069"/>
           </a:xfrm>
           <a:prstGeom prst="rect">
             <a:avLst/>
@@ -2166,8 +2167,8 @@
           <p:nvPr/>
         </p:nvGraphicFramePr>
         <p:xfrm>
-          <a:off x="30797500" y="20055120"/>
-          <a:ext cx="11794431" cy="10326806"/>
+          <a:off x="30746700" y="20359920"/>
+          <a:ext cx="13325391" cy="10870600"/>
         </p:xfrm>
         <a:graphic xmlns:a="http://schemas.openxmlformats.org/drawingml/2006/main">
           <a:graphicData uri="http://schemas.openxmlformats.org/drawingml/2006/table">
@@ -2176,12 +2177,12 @@
                 <a:tableStyleId>{2708684C-4D16-4618-839F-0558EEFCDFE6}</a:tableStyleId>
               </a:tblPr>
               <a:tblGrid>
-                <a:gridCol w="1788645"/>
-                <a:gridCol w="4102219"/>
-                <a:gridCol w="1788645"/>
-                <a:gridCol w="4102219"/>
+                <a:gridCol w="2200672"/>
+                <a:gridCol w="4775200"/>
+                <a:gridCol w="2366764"/>
+                <a:gridCol w="3978374"/>
               </a:tblGrid>
-              <a:tr h="621819">
+              <a:tr h="674141">
                 <a:tc>
                   <a:txBody>
                     <a:bodyPr/>
@@ -2194,7 +2195,7 @@
                         <a:defRPr b="0" sz="1800"/>
                       </a:pPr>
                       <a:r>
-                        <a:rPr b="1">
+                        <a:rPr b="1" sz="2400">
                           <a:latin typeface="Arial"/>
                           <a:ea typeface="Arial"/>
                           <a:cs typeface="Arial"/>
@@ -2234,7 +2235,7 @@
                         <a:defRPr sz="1800"/>
                       </a:pPr>
                       <a:r>
-                        <a:rPr b="1">
+                        <a:rPr b="1" sz="2400">
                           <a:latin typeface="Arial"/>
                           <a:ea typeface="Arial"/>
                           <a:cs typeface="Arial"/>
@@ -2271,7 +2272,7 @@
                         <a:defRPr sz="1800"/>
                       </a:pPr>
                       <a:r>
-                        <a:rPr b="1">
+                        <a:rPr b="1" sz="2400">
                           <a:latin typeface="Arial"/>
                           <a:ea typeface="Arial"/>
                           <a:cs typeface="Arial"/>
@@ -2305,7 +2306,7 @@
                         <a:defRPr sz="1800"/>
                       </a:pPr>
                       <a:r>
-                        <a:rPr b="1">
+                        <a:rPr b="1" sz="2400">
                           <a:latin typeface="Arial"/>
                           <a:ea typeface="Arial"/>
                           <a:cs typeface="Arial"/>
@@ -2350,7 +2351,7 @@
                         <a:defRPr b="0" sz="1800"/>
                       </a:pPr>
                       <a:r>
-                        <a:rPr b="1" sz="1300">
+                        <a:rPr b="1" sz="2400">
                           <a:latin typeface="Arial"/>
                           <a:ea typeface="Arial"/>
                           <a:cs typeface="Arial"/>
@@ -2387,7 +2388,7 @@
                         <a:defRPr sz="1800"/>
                       </a:pPr>
                       <a:r>
-                        <a:rPr sz="1300">
+                        <a:rPr sz="2400">
                           <a:latin typeface="Arial"/>
                           <a:ea typeface="Arial"/>
                           <a:cs typeface="Arial"/>
@@ -2415,7 +2416,7 @@
                         <a:defRPr sz="1800"/>
                       </a:pPr>
                       <a:r>
-                        <a:rPr b="1" sz="1300">
+                        <a:rPr b="1" sz="2400">
                           <a:latin typeface="Arial"/>
                           <a:ea typeface="Arial"/>
                           <a:cs typeface="Arial"/>
@@ -2443,7 +2444,7 @@
                         <a:defRPr sz="1800"/>
                       </a:pPr>
                       <a:r>
-                        <a:rPr sz="1300">
+                        <a:rPr sz="2400">
                           <a:latin typeface="Arial"/>
                           <a:ea typeface="Arial"/>
                           <a:cs typeface="Arial"/>
@@ -2482,7 +2483,7 @@
                         <a:defRPr b="0" sz="1800"/>
                       </a:pPr>
                       <a:r>
-                        <a:rPr b="1" sz="1300">
+                        <a:rPr b="1" sz="2400">
                           <a:latin typeface="Arial"/>
                           <a:ea typeface="Arial"/>
                           <a:cs typeface="Arial"/>
@@ -2510,7 +2511,7 @@
                         <a:defRPr sz="1800"/>
                       </a:pPr>
                       <a:r>
-                        <a:rPr sz="1300">
+                        <a:rPr sz="2400">
                           <a:latin typeface="Arial"/>
                           <a:ea typeface="Arial"/>
                           <a:cs typeface="Arial"/>
@@ -2531,7 +2532,7 @@
                         <a:defRPr sz="1800"/>
                       </a:pPr>
                       <a:r>
-                        <a:rPr b="1" sz="1300">
+                        <a:rPr b="1" sz="2400">
                           <a:latin typeface="Arial"/>
                           <a:ea typeface="Arial"/>
                           <a:cs typeface="Arial"/>
@@ -2552,7 +2553,7 @@
                         <a:defRPr sz="1800"/>
                       </a:pPr>
                       <a:r>
-                        <a:rPr sz="1300">
+                        <a:rPr sz="2400">
                           <a:latin typeface="Arial"/>
                           <a:ea typeface="Arial"/>
                           <a:cs typeface="Arial"/>
@@ -2585,7 +2586,7 @@
                         <a:defRPr b="0" sz="1800"/>
                       </a:pPr>
                       <a:r>
-                        <a:rPr b="1" sz="1300">
+                        <a:rPr b="1" sz="2400">
                           <a:latin typeface="Arial"/>
                           <a:ea typeface="Arial"/>
                           <a:cs typeface="Arial"/>
@@ -2613,7 +2614,7 @@
                         <a:defRPr sz="1800"/>
                       </a:pPr>
                       <a:r>
-                        <a:rPr sz="1300">
+                        <a:rPr sz="2400">
                           <a:latin typeface="Arial"/>
                           <a:ea typeface="Arial"/>
                           <a:cs typeface="Arial"/>
@@ -2634,7 +2635,7 @@
                         <a:defRPr sz="1800"/>
                       </a:pPr>
                       <a:r>
-                        <a:rPr b="1" sz="1300">
+                        <a:rPr b="1" sz="2400">
                           <a:latin typeface="Arial"/>
                           <a:ea typeface="Arial"/>
                           <a:cs typeface="Arial"/>
@@ -2655,7 +2656,7 @@
                         <a:defRPr sz="1800"/>
                       </a:pPr>
                       <a:r>
-                        <a:rPr sz="1300">
+                        <a:rPr sz="2400">
                           <a:latin typeface="Arial"/>
                           <a:ea typeface="Arial"/>
                           <a:cs typeface="Arial"/>
@@ -2675,7 +2676,7 @@
                   </a:tcPr>
                 </a:tc>
               </a:tr>
-              <a:tr h="684474">
+              <a:tr h="863663">
                 <a:tc>
                   <a:txBody>
                     <a:bodyPr/>
@@ -2688,7 +2689,7 @@
                         <a:defRPr b="0" sz="1800"/>
                       </a:pPr>
                       <a:r>
-                        <a:rPr b="1" sz="1300">
+                        <a:rPr b="1" sz="2400">
                           <a:latin typeface="Arial"/>
                           <a:ea typeface="Arial"/>
                           <a:cs typeface="Arial"/>
@@ -2716,7 +2717,7 @@
                         <a:defRPr sz="1800"/>
                       </a:pPr>
                       <a:r>
-                        <a:rPr sz="1300">
+                        <a:rPr sz="2400">
                           <a:latin typeface="Arial"/>
                           <a:ea typeface="Arial"/>
                           <a:cs typeface="Arial"/>
@@ -2740,7 +2741,7 @@
                         <a:defRPr sz="1800"/>
                       </a:pPr>
                       <a:r>
-                        <a:rPr b="1" sz="1300">
+                        <a:rPr b="1" sz="2400">
                           <a:latin typeface="Arial"/>
                           <a:ea typeface="Arial"/>
                           <a:cs typeface="Arial"/>
@@ -2761,7 +2762,7 @@
                         <a:defRPr sz="1800"/>
                       </a:pPr>
                       <a:r>
-                        <a:rPr sz="1300">
+                        <a:rPr sz="2400">
                           <a:latin typeface="Arial"/>
                           <a:ea typeface="Arial"/>
                           <a:cs typeface="Arial"/>
@@ -2781,7 +2782,7 @@
                   </a:tcPr>
                 </a:tc>
               </a:tr>
-              <a:tr h="832751">
+              <a:tr h="932705">
                 <a:tc>
                   <a:txBody>
                     <a:bodyPr/>
@@ -2794,7 +2795,7 @@
                         <a:defRPr b="0" sz="1800"/>
                       </a:pPr>
                       <a:r>
-                        <a:rPr b="1" sz="1300">
+                        <a:rPr b="1" sz="2400">
                           <a:latin typeface="Arial"/>
                           <a:ea typeface="Arial"/>
                           <a:cs typeface="Arial"/>
@@ -2822,7 +2823,7 @@
                         <a:defRPr sz="1800"/>
                       </a:pPr>
                       <a:r>
-                        <a:rPr sz="1300">
+                        <a:rPr sz="2400">
                           <a:latin typeface="Arial"/>
                           <a:ea typeface="Arial"/>
                           <a:cs typeface="Arial"/>
@@ -2844,7 +2845,7 @@
                         <a:defRPr sz="1800"/>
                       </a:pPr>
                       <a:r>
-                        <a:rPr b="1" sz="1300">
+                        <a:rPr b="1" sz="2400">
                           <a:latin typeface="Arial"/>
                           <a:ea typeface="Arial"/>
                           <a:cs typeface="Arial"/>
@@ -2865,7 +2866,7 @@
                         <a:defRPr sz="1800"/>
                       </a:pPr>
                       <a:r>
-                        <a:rPr sz="1300">
+                        <a:rPr sz="2400">
                           <a:latin typeface="Arial"/>
                           <a:ea typeface="Arial"/>
                           <a:cs typeface="Arial"/>
@@ -2898,7 +2899,7 @@
                         <a:defRPr b="0" sz="1800"/>
                       </a:pPr>
                       <a:r>
-                        <a:rPr b="1" sz="1300">
+                        <a:rPr b="1" sz="2400">
                           <a:latin typeface="Arial"/>
                           <a:ea typeface="Arial"/>
                           <a:cs typeface="Arial"/>
@@ -2926,7 +2927,7 @@
                         <a:defRPr sz="1800"/>
                       </a:pPr>
                       <a:r>
-                        <a:rPr sz="1300">
+                        <a:rPr sz="2400">
                           <a:latin typeface="Arial"/>
                           <a:ea typeface="Arial"/>
                           <a:cs typeface="Arial"/>
@@ -2947,7 +2948,7 @@
                         <a:defRPr sz="1800"/>
                       </a:pPr>
                       <a:r>
-                        <a:rPr b="1" sz="1300">
+                        <a:rPr b="1" sz="2400">
                           <a:latin typeface="Arial"/>
                           <a:ea typeface="Arial"/>
                           <a:cs typeface="Arial"/>
@@ -2968,7 +2969,7 @@
                         <a:defRPr sz="1800"/>
                       </a:pPr>
                       <a:r>
-                        <a:rPr sz="1300">
+                        <a:rPr sz="2400">
                           <a:latin typeface="Arial"/>
                           <a:ea typeface="Arial"/>
                           <a:cs typeface="Arial"/>
@@ -3001,7 +3002,7 @@
                         <a:defRPr b="0" sz="1800"/>
                       </a:pPr>
                       <a:r>
-                        <a:rPr b="1" sz="1300">
+                        <a:rPr b="1" sz="2400">
                           <a:latin typeface="Arial"/>
                           <a:ea typeface="Arial"/>
                           <a:cs typeface="Arial"/>
@@ -3029,7 +3030,7 @@
                         <a:defRPr sz="1800"/>
                       </a:pPr>
                       <a:r>
-                        <a:rPr sz="1300">
+                        <a:rPr sz="2400">
                           <a:latin typeface="Arial"/>
                           <a:ea typeface="Arial"/>
                           <a:cs typeface="Arial"/>
@@ -3050,7 +3051,7 @@
                         <a:defRPr sz="1800"/>
                       </a:pPr>
                       <a:r>
-                        <a:rPr b="1" sz="1300">
+                        <a:rPr b="1" sz="2400">
                           <a:latin typeface="Arial"/>
                           <a:ea typeface="Arial"/>
                           <a:cs typeface="Arial"/>
@@ -3071,7 +3072,7 @@
                         <a:defRPr sz="1800"/>
                       </a:pPr>
                       <a:r>
-                        <a:rPr sz="1300">
+                        <a:rPr sz="2400">
                           <a:latin typeface="Arial"/>
                           <a:ea typeface="Arial"/>
                           <a:cs typeface="Arial"/>
@@ -3101,7 +3102,7 @@
                         <a:defRPr b="0" sz="1800"/>
                       </a:pPr>
                       <a:r>
-                        <a:rPr b="1" sz="1300">
+                        <a:rPr b="1" sz="2400">
                           <a:latin typeface="Arial"/>
                           <a:ea typeface="Arial"/>
                           <a:cs typeface="Arial"/>
@@ -3129,7 +3130,7 @@
                         <a:defRPr sz="1800"/>
                       </a:pPr>
                       <a:r>
-                        <a:rPr sz="1300">
+                        <a:rPr sz="2400">
                           <a:latin typeface="Arial"/>
                           <a:ea typeface="Arial"/>
                           <a:cs typeface="Arial"/>
@@ -3150,7 +3151,7 @@
                         <a:defRPr sz="1800"/>
                       </a:pPr>
                       <a:r>
-                        <a:rPr b="1" sz="1300">
+                        <a:rPr b="1" sz="2400">
                           <a:latin typeface="Arial"/>
                           <a:ea typeface="Arial"/>
                           <a:cs typeface="Arial"/>
@@ -3171,7 +3172,7 @@
                         <a:defRPr sz="1800"/>
                       </a:pPr>
                       <a:r>
-                        <a:rPr sz="1300">
+                        <a:rPr sz="2400">
                           <a:latin typeface="Arial"/>
                           <a:ea typeface="Arial"/>
                           <a:cs typeface="Arial"/>
@@ -3204,7 +3205,7 @@
                         <a:defRPr b="0" sz="1800"/>
                       </a:pPr>
                       <a:r>
-                        <a:rPr b="1" sz="1300">
+                        <a:rPr b="1" sz="2400">
                           <a:latin typeface="Arial"/>
                           <a:ea typeface="Arial"/>
                           <a:cs typeface="Arial"/>
@@ -3232,7 +3233,7 @@
                         <a:defRPr sz="1800"/>
                       </a:pPr>
                       <a:r>
-                        <a:rPr sz="1300">
+                        <a:rPr sz="2400">
                           <a:latin typeface="Arial"/>
                           <a:ea typeface="Arial"/>
                           <a:cs typeface="Arial"/>
@@ -3253,7 +3254,7 @@
                         <a:defRPr sz="1800"/>
                       </a:pPr>
                       <a:r>
-                        <a:rPr b="1" sz="1300">
+                        <a:rPr b="1" sz="2400">
                           <a:latin typeface="Arial"/>
                           <a:ea typeface="Arial"/>
                           <a:cs typeface="Arial"/>
@@ -3274,7 +3275,7 @@
                         <a:defRPr sz="1800"/>
                       </a:pPr>
                       <a:r>
-                        <a:rPr sz="1300">
+                        <a:rPr sz="2400">
                           <a:latin typeface="Arial"/>
                           <a:ea typeface="Arial"/>
                           <a:cs typeface="Arial"/>
@@ -3307,7 +3308,7 @@
                         <a:defRPr b="0" sz="1800"/>
                       </a:pPr>
                       <a:r>
-                        <a:rPr b="1" sz="1300">
+                        <a:rPr b="1" sz="2400">
                           <a:latin typeface="Arial"/>
                           <a:ea typeface="Arial"/>
                           <a:cs typeface="Arial"/>
@@ -3338,7 +3339,7 @@
                         <a:defRPr sz="1800"/>
                       </a:pPr>
                       <a:r>
-                        <a:rPr sz="1300">
+                        <a:rPr sz="2400">
                           <a:latin typeface="Arial"/>
                           <a:ea typeface="Arial"/>
                           <a:cs typeface="Arial"/>
@@ -3359,7 +3360,7 @@
                         <a:defRPr sz="1800"/>
                       </a:pPr>
                       <a:r>
-                        <a:rPr b="1" sz="1300">
+                        <a:rPr b="1" sz="2400">
                           <a:latin typeface="Arial"/>
                           <a:ea typeface="Arial"/>
                           <a:cs typeface="Arial"/>
@@ -3380,7 +3381,7 @@
                         <a:defRPr sz="1800"/>
                       </a:pPr>
                       <a:r>
-                        <a:rPr sz="1300">
+                        <a:rPr sz="2400">
                           <a:latin typeface="Arial"/>
                           <a:ea typeface="Arial"/>
                           <a:cs typeface="Arial"/>
@@ -3400,7 +3401,7 @@
                   </a:tcPr>
                 </a:tc>
               </a:tr>
-              <a:tr h="713225">
+              <a:tr h="925553">
                 <a:tc>
                   <a:txBody>
                     <a:bodyPr/>
@@ -3410,7 +3411,7 @@
                         <a:defRPr b="0" sz="1800"/>
                       </a:pPr>
                       <a:r>
-                        <a:rPr b="1" sz="1300">
+                        <a:rPr b="1" sz="2400">
                           <a:latin typeface="Arial"/>
                           <a:ea typeface="Arial"/>
                           <a:cs typeface="Arial"/>
@@ -3438,7 +3439,7 @@
                         <a:defRPr sz="1800"/>
                       </a:pPr>
                       <a:r>
-                        <a:rPr sz="1300">
+                        <a:rPr sz="2400">
                           <a:latin typeface="Arial"/>
                           <a:ea typeface="Arial"/>
                           <a:cs typeface="Arial"/>
@@ -3459,7 +3460,7 @@
                         <a:defRPr sz="1800"/>
                       </a:pPr>
                       <a:r>
-                        <a:rPr b="1" sz="1300">
+                        <a:rPr b="1" sz="2400">
                           <a:latin typeface="Arial"/>
                           <a:ea typeface="Arial"/>
                           <a:cs typeface="Arial"/>
@@ -3480,7 +3481,7 @@
                         <a:defRPr sz="1800"/>
                       </a:pPr>
                       <a:r>
-                        <a:rPr sz="1300">
+                        <a:rPr sz="2400">
                           <a:latin typeface="Arial"/>
                           <a:ea typeface="Arial"/>
                           <a:cs typeface="Arial"/>
@@ -3510,7 +3511,7 @@
                         <a:defRPr b="0" sz="1800"/>
                       </a:pPr>
                       <a:r>
-                        <a:rPr b="1" sz="1300">
+                        <a:rPr b="1" sz="2400">
                           <a:latin typeface="Arial"/>
                           <a:ea typeface="Arial"/>
                           <a:cs typeface="Arial"/>
@@ -3538,7 +3539,7 @@
                         <a:defRPr sz="1800"/>
                       </a:pPr>
                       <a:r>
-                        <a:rPr sz="1300">
+                        <a:rPr sz="2400">
                           <a:latin typeface="Arial"/>
                           <a:ea typeface="Arial"/>
                           <a:cs typeface="Arial"/>
@@ -3562,7 +3563,7 @@
                         <a:defRPr sz="1800"/>
                       </a:pPr>
                       <a:r>
-                        <a:rPr b="1" sz="1300">
+                        <a:rPr b="1" sz="2400">
                           <a:latin typeface="Arial"/>
                           <a:ea typeface="Arial"/>
                           <a:cs typeface="Arial"/>
@@ -3583,7 +3584,7 @@
                         <a:defRPr sz="1800"/>
                       </a:pPr>
                       <a:r>
-                        <a:rPr sz="1300">
+                        <a:rPr sz="2400">
                           <a:latin typeface="Arial"/>
                           <a:ea typeface="Arial"/>
                           <a:cs typeface="Arial"/>
@@ -3616,7 +3617,7 @@
                         <a:defRPr b="0" sz="1800"/>
                       </a:pPr>
                       <a:r>
-                        <a:rPr b="1" sz="1300">
+                        <a:rPr b="1" sz="2400">
                           <a:latin typeface="Arial"/>
                           <a:ea typeface="Arial"/>
                           <a:cs typeface="Arial"/>
@@ -3644,7 +3645,7 @@
                         <a:defRPr sz="1800"/>
                       </a:pPr>
                       <a:r>
-                        <a:rPr sz="1300">
+                        <a:rPr sz="2400">
                           <a:latin typeface="Arial"/>
                           <a:ea typeface="Arial"/>
                           <a:cs typeface="Arial"/>
@@ -3665,7 +3666,7 @@
                         <a:defRPr sz="1800"/>
                       </a:pPr>
                       <a:r>
-                        <a:rPr b="1" sz="1300">
+                        <a:rPr b="1" sz="2400">
                           <a:latin typeface="Arial"/>
                           <a:ea typeface="Arial"/>
                           <a:cs typeface="Arial"/>
@@ -3686,7 +3687,7 @@
                         <a:defRPr sz="1800"/>
                       </a:pPr>
                       <a:r>
-                        <a:rPr sz="1300">
+                        <a:rPr sz="2400">
                           <a:latin typeface="Arial"/>
                           <a:ea typeface="Arial"/>
                           <a:cs typeface="Arial"/>
@@ -3716,7 +3717,7 @@
                         <a:defRPr b="0" sz="1800"/>
                       </a:pPr>
                       <a:r>
-                        <a:rPr b="1" sz="1300">
+                        <a:rPr b="1" sz="2400">
                           <a:latin typeface="Arial"/>
                           <a:ea typeface="Arial"/>
                           <a:cs typeface="Arial"/>
@@ -3744,7 +3745,7 @@
                         <a:defRPr sz="1800"/>
                       </a:pPr>
                       <a:r>
-                        <a:rPr sz="1300">
+                        <a:rPr sz="2400">
                           <a:latin typeface="Arial"/>
                           <a:ea typeface="Arial"/>
                           <a:cs typeface="Arial"/>
@@ -3768,7 +3769,7 @@
                         <a:defRPr sz="1800"/>
                       </a:pPr>
                       <a:r>
-                        <a:rPr b="1" sz="1300">
+                        <a:rPr b="1" sz="2400">
                           <a:latin typeface="Arial"/>
                           <a:ea typeface="Arial"/>
                           <a:cs typeface="Arial"/>
@@ -3789,7 +3790,7 @@
                         <a:defRPr sz="1800"/>
                       </a:pPr>
                       <a:r>
-                        <a:rPr sz="1300">
+                        <a:rPr sz="2400">
                           <a:latin typeface="Arial"/>
                           <a:ea typeface="Arial"/>
                           <a:cs typeface="Arial"/>
@@ -3819,7 +3820,7 @@
                         <a:defRPr b="0" sz="1800"/>
                       </a:pPr>
                       <a:r>
-                        <a:rPr b="1" sz="1300">
+                        <a:rPr b="1" sz="2400">
                           <a:latin typeface="Arial"/>
                           <a:ea typeface="Arial"/>
                           <a:cs typeface="Arial"/>
@@ -3853,7 +3854,7 @@
                         <a:defRPr sz="1800"/>
                       </a:pPr>
                       <a:r>
-                        <a:rPr sz="1300">
+                        <a:rPr sz="2400">
                           <a:latin typeface="Arial"/>
                           <a:ea typeface="Arial"/>
                           <a:cs typeface="Arial"/>
@@ -3878,7 +3879,7 @@
                     <a:lstStyle/>
                     <a:p>
                       <a:pPr lvl="0" defTabSz="914400">
-                        <a:defRPr sz="1600">
+                        <a:defRPr sz="2400">
                           <a:latin typeface="Arial"/>
                           <a:ea typeface="Arial"/>
                           <a:cs typeface="Arial"/>
@@ -3902,7 +3903,7 @@
                     <a:lstStyle/>
                     <a:p>
                       <a:pPr lvl="0" defTabSz="914400">
-                        <a:defRPr sz="1600">
+                        <a:defRPr sz="2400">
                           <a:latin typeface="Arial"/>
                           <a:ea typeface="Arial"/>
                           <a:cs typeface="Arial"/>
@@ -4359,44 +4360,9 @@
           </a:p>
         </p:txBody>
       </p:sp>
-      <p:sp>
-        <p:nvSpPr>
-          <p:cNvPr id="51" name="Shape 51"/>
-          <p:cNvSpPr/>
-          <p:nvPr/>
-        </p:nvSpPr>
-        <p:spPr>
-          <a:xfrm>
-            <a:off x="4402666" y="8898466"/>
-            <a:ext cx="36525927" cy="699878"/>
-          </a:xfrm>
-          <a:prstGeom prst="rect">
-            <a:avLst/>
-          </a:prstGeom>
-          <a:solidFill>
-            <a:srgbClr val="FFFFFF"/>
-          </a:solidFill>
-          <a:ln w="12700">
-            <a:miter lim="400000"/>
-          </a:ln>
-        </p:spPr>
-        <p:txBody>
-          <a:bodyPr lIns="0" tIns="0" rIns="0" bIns="0" anchor="ctr"/>
-          <a:lstStyle/>
-          <a:p>
-            <a:pPr lvl="0">
-              <a:defRPr sz="7600">
-                <a:solidFill>
-                  <a:srgbClr val="FFFFFF"/>
-                </a:solidFill>
-              </a:defRPr>
-            </a:pPr>
-          </a:p>
-        </p:txBody>
-      </p:sp>
       <p:pic>
         <p:nvPicPr>
-          <p:cNvPr id="52" name="picnic-no-weights.pdf"/>
+          <p:cNvPr id="51" name="picnic-no-weights.pdf"/>
           <p:cNvPicPr/>
           <p:nvPr/>
         </p:nvPicPr>
@@ -4411,7 +4377,7 @@
         </p:blipFill>
         <p:spPr>
           <a:xfrm>
-            <a:off x="18213066" y="17761638"/>
+            <a:off x="18162266" y="18066438"/>
             <a:ext cx="10529979" cy="14901246"/>
           </a:xfrm>
           <a:prstGeom prst="rect">
@@ -4424,21 +4390,22 @@
       </p:pic>
       <p:pic>
         <p:nvPicPr>
-          <p:cNvPr id="53" name="d5-(b)-avgc.pdf"/>
+          <p:cNvPr id="52" name="d5-(b)-avgc.pdf"/>
           <p:cNvPicPr/>
           <p:nvPr/>
         </p:nvPicPr>
         <p:blipFill>
-          <a:blip r:embed="rId3">
+          <a:blip r:embed="rId9">
             <a:extLst/>
           </a:blip>
+          <a:srcRect l="0" t="348" r="0" b="348"/>
           <a:stretch>
             <a:fillRect/>
           </a:stretch>
         </p:blipFill>
         <p:spPr>
           <a:xfrm>
-            <a:off x="4361279" y="9487582"/>
+            <a:off x="4310479" y="10221709"/>
             <a:ext cx="6893947" cy="8187289"/>
           </a:xfrm>
           <a:prstGeom prst="rect">
@@ -4451,34 +4418,7 @@
       </p:pic>
       <p:pic>
         <p:nvPicPr>
-          <p:cNvPr id="54" name="d5-(d)-avgc.pdf"/>
-          <p:cNvPicPr/>
-          <p:nvPr/>
-        </p:nvPicPr>
-        <p:blipFill>
-          <a:blip r:embed="rId9">
-            <a:extLst/>
-          </a:blip>
-          <a:stretch>
-            <a:fillRect/>
-          </a:stretch>
-        </p:blipFill>
-        <p:spPr>
-          <a:xfrm>
-            <a:off x="11892507" y="9562909"/>
-            <a:ext cx="6825867" cy="8091488"/>
-          </a:xfrm>
-          <a:prstGeom prst="rect">
-            <a:avLst/>
-          </a:prstGeom>
-          <a:ln w="12700">
-            <a:miter lim="400000"/>
-          </a:ln>
-        </p:spPr>
-      </p:pic>
-      <p:pic>
-        <p:nvPicPr>
-          <p:cNvPr id="55" name="d5-(e)-avgc.pdf"/>
+          <p:cNvPr id="53" name="d5-(d)-avgc.pdf"/>
           <p:cNvPicPr/>
           <p:nvPr/>
         </p:nvPicPr>
@@ -4492,8 +4432,8 @@
         </p:blipFill>
         <p:spPr>
           <a:xfrm>
-            <a:off x="19317555" y="9540409"/>
-            <a:ext cx="6816681" cy="8128176"/>
+            <a:off x="11841707" y="10297036"/>
+            <a:ext cx="6825867" cy="8091489"/>
           </a:xfrm>
           <a:prstGeom prst="rect">
             <a:avLst/>
@@ -4505,7 +4445,7 @@
       </p:pic>
       <p:pic>
         <p:nvPicPr>
-          <p:cNvPr id="56" name="d5-(r)-avgc.pdf"/>
+          <p:cNvPr id="54" name="d5-(e)-avgc.pdf"/>
           <p:cNvPicPr/>
           <p:nvPr/>
         </p:nvPicPr>
@@ -4519,8 +4459,8 @@
         </p:blipFill>
         <p:spPr>
           <a:xfrm>
-            <a:off x="26746119" y="9552775"/>
-            <a:ext cx="6808126" cy="8103443"/>
+            <a:off x="19266755" y="10274536"/>
+            <a:ext cx="6816681" cy="8128176"/>
           </a:xfrm>
           <a:prstGeom prst="rect">
             <a:avLst/>
@@ -4532,7 +4472,7 @@
       </p:pic>
       <p:pic>
         <p:nvPicPr>
-          <p:cNvPr id="57" name="d5-(u)-avgc.pdf"/>
+          <p:cNvPr id="55" name="d5-(r)-avgc.pdf"/>
           <p:cNvPicPr/>
           <p:nvPr/>
         </p:nvPicPr>
@@ -4546,8 +4486,35 @@
         </p:blipFill>
         <p:spPr>
           <a:xfrm>
-            <a:off x="34140725" y="9520298"/>
-            <a:ext cx="6849169" cy="8187289"/>
+            <a:off x="26695319" y="10286903"/>
+            <a:ext cx="6808126" cy="8103442"/>
+          </a:xfrm>
+          <a:prstGeom prst="rect">
+            <a:avLst/>
+          </a:prstGeom>
+          <a:ln w="12700">
+            <a:miter lim="400000"/>
+          </a:ln>
+        </p:spPr>
+      </p:pic>
+      <p:pic>
+        <p:nvPicPr>
+          <p:cNvPr id="56" name="d5-(u)-avgc.pdf"/>
+          <p:cNvPicPr/>
+          <p:nvPr/>
+        </p:nvPicPr>
+        <p:blipFill>
+          <a:blip r:embed="rId13">
+            <a:extLst/>
+          </a:blip>
+          <a:stretch>
+            <a:fillRect/>
+          </a:stretch>
+        </p:blipFill>
+        <p:spPr>
+          <a:xfrm>
+            <a:off x="34089925" y="10254426"/>
+            <a:ext cx="6849169" cy="8187288"/>
           </a:xfrm>
           <a:prstGeom prst="rect">
             <a:avLst/>
@@ -4559,13 +4526,13 @@
       </p:pic>
       <p:sp>
         <p:nvSpPr>
-          <p:cNvPr id="58" name="Shape 58"/>
+          <p:cNvPr id="57" name="Shape 57"/>
           <p:cNvSpPr/>
           <p:nvPr/>
         </p:nvSpPr>
         <p:spPr>
           <a:xfrm>
-            <a:off x="3741056" y="15110195"/>
+            <a:off x="3690256" y="15844322"/>
             <a:ext cx="656693" cy="1233278"/>
           </a:xfrm>
           <a:prstGeom prst="rect">
@@ -4627,14 +4594,14 @@
       </p:sp>
       <p:sp>
         <p:nvSpPr>
-          <p:cNvPr id="59" name="Shape 59"/>
+          <p:cNvPr id="58" name="Shape 58"/>
           <p:cNvSpPr/>
           <p:nvPr/>
         </p:nvSpPr>
         <p:spPr>
           <a:xfrm>
-            <a:off x="3458245" y="9877794"/>
-            <a:ext cx="910519" cy="699878"/>
+            <a:off x="3407445" y="10611922"/>
+            <a:ext cx="910519" cy="699877"/>
           </a:xfrm>
           <a:prstGeom prst="rect">
             <a:avLst/>
@@ -4672,14 +4639,14 @@
       </p:sp>
       <p:sp>
         <p:nvSpPr>
-          <p:cNvPr id="60" name="Shape 60"/>
+          <p:cNvPr id="59" name="Shape 59"/>
           <p:cNvSpPr/>
           <p:nvPr/>
         </p:nvSpPr>
         <p:spPr>
           <a:xfrm>
-            <a:off x="3305838" y="11071594"/>
-            <a:ext cx="1088332" cy="699878"/>
+            <a:off x="3255038" y="11805722"/>
+            <a:ext cx="1088332" cy="699877"/>
           </a:xfrm>
           <a:prstGeom prst="rect">
             <a:avLst/>
@@ -4717,13 +4684,13 @@
       </p:sp>
       <p:sp>
         <p:nvSpPr>
-          <p:cNvPr id="61" name="Shape 61"/>
+          <p:cNvPr id="60" name="Shape 60"/>
           <p:cNvSpPr/>
           <p:nvPr/>
         </p:nvSpPr>
         <p:spPr>
           <a:xfrm>
-            <a:off x="3360099" y="12290794"/>
+            <a:off x="3309299" y="13024922"/>
             <a:ext cx="1012206" cy="433178"/>
           </a:xfrm>
           <a:prstGeom prst="rect">
@@ -4762,13 +4729,13 @@
       </p:sp>
       <p:sp>
         <p:nvSpPr>
-          <p:cNvPr id="62" name="Shape 62"/>
+          <p:cNvPr id="61" name="Shape 61"/>
           <p:cNvSpPr/>
           <p:nvPr/>
         </p:nvSpPr>
         <p:spPr>
           <a:xfrm>
-            <a:off x="3671225" y="13478059"/>
+            <a:off x="3620425" y="14212186"/>
             <a:ext cx="694755" cy="433178"/>
           </a:xfrm>
           <a:prstGeom prst="rect">
@@ -4807,14 +4774,14 @@
       </p:sp>
       <p:sp>
         <p:nvSpPr>
-          <p:cNvPr id="63" name="Shape 63"/>
+          <p:cNvPr id="62" name="Shape 62"/>
           <p:cNvSpPr/>
           <p:nvPr/>
         </p:nvSpPr>
         <p:spPr>
           <a:xfrm>
-            <a:off x="3437092" y="14678021"/>
-            <a:ext cx="961195" cy="433178"/>
+            <a:off x="3386292" y="15412149"/>
+            <a:ext cx="961195" cy="433177"/>
           </a:xfrm>
           <a:prstGeom prst="rect">
             <a:avLst/>
@@ -4852,7 +4819,7 @@
       </p:sp>
       <p:sp>
         <p:nvSpPr>
-          <p:cNvPr id="64" name="Shape 64"/>
+          <p:cNvPr id="63" name="Shape 63"/>
           <p:cNvSpPr/>
           <p:nvPr/>
         </p:nvSpPr>
@@ -4881,7 +4848,7 @@
       </p:sp>
       <p:sp>
         <p:nvSpPr>
-          <p:cNvPr id="65" name="Shape 65"/>
+          <p:cNvPr id="64" name="Shape 64"/>
           <p:cNvSpPr/>
           <p:nvPr/>
         </p:nvSpPr>
@@ -4910,7 +4877,7 @@
       </p:sp>
       <p:sp>
         <p:nvSpPr>
-          <p:cNvPr id="66" name="Shape 66"/>
+          <p:cNvPr id="65" name="Shape 65"/>
           <p:cNvSpPr/>
           <p:nvPr/>
         </p:nvSpPr>
@@ -4939,7 +4906,7 @@
       </p:sp>
       <p:sp>
         <p:nvSpPr>
-          <p:cNvPr id="67" name="Shape 67"/>
+          <p:cNvPr id="66" name="Shape 66"/>
           <p:cNvSpPr/>
           <p:nvPr/>
         </p:nvSpPr>
@@ -4968,14 +4935,14 @@
       </p:sp>
       <p:sp>
         <p:nvSpPr>
-          <p:cNvPr id="68" name="Shape 68"/>
+          <p:cNvPr id="67" name="Shape 67"/>
           <p:cNvSpPr/>
           <p:nvPr/>
         </p:nvSpPr>
         <p:spPr>
           <a:xfrm rot="16200000">
-            <a:off x="-20110" y="12899023"/>
-            <a:ext cx="5658493" cy="554956"/>
+            <a:off x="-70910" y="13633150"/>
+            <a:ext cx="5658493" cy="554957"/>
           </a:xfrm>
           <a:prstGeom prst="rect">
             <a:avLst/>
@@ -5016,14 +4983,14 @@
       </p:sp>
       <p:sp>
         <p:nvSpPr>
-          <p:cNvPr id="69" name="Shape 69"/>
+          <p:cNvPr id="68" name="Shape 68"/>
           <p:cNvSpPr/>
           <p:nvPr/>
         </p:nvSpPr>
         <p:spPr>
           <a:xfrm flipV="1">
-            <a:off x="3209840" y="9817376"/>
-            <a:ext cx="1" cy="6618355"/>
+            <a:off x="3159040" y="10551504"/>
+            <a:ext cx="1" cy="6618354"/>
           </a:xfrm>
           <a:prstGeom prst="line">
             <a:avLst/>
@@ -5045,13 +5012,13 @@
       </p:sp>
       <p:sp>
         <p:nvSpPr>
-          <p:cNvPr id="70" name="Shape 70"/>
+          <p:cNvPr id="69" name="Shape 69"/>
           <p:cNvSpPr/>
           <p:nvPr/>
         </p:nvSpPr>
         <p:spPr>
           <a:xfrm>
-            <a:off x="3218306" y="9822021"/>
+            <a:off x="3160361" y="10517319"/>
             <a:ext cx="252113" cy="1"/>
           </a:xfrm>
           <a:prstGeom prst="line">
@@ -5074,13 +5041,13 @@
       </p:sp>
       <p:sp>
         <p:nvSpPr>
-          <p:cNvPr id="71" name="Shape 71"/>
+          <p:cNvPr id="70" name="Shape 70"/>
           <p:cNvSpPr/>
           <p:nvPr/>
         </p:nvSpPr>
         <p:spPr>
           <a:xfrm>
-            <a:off x="3207009" y="16454780"/>
+            <a:off x="3156209" y="17188907"/>
             <a:ext cx="252114" cy="1"/>
           </a:xfrm>
           <a:prstGeom prst="line">
@@ -5103,13 +5070,13 @@
       </p:sp>
       <p:sp>
         <p:nvSpPr>
-          <p:cNvPr id="72" name="Shape 72"/>
+          <p:cNvPr id="71" name="Shape 71"/>
           <p:cNvSpPr/>
           <p:nvPr/>
         </p:nvSpPr>
         <p:spPr>
           <a:xfrm>
-            <a:off x="2978308" y="13189201"/>
+            <a:off x="2927508" y="13923328"/>
             <a:ext cx="252113" cy="1"/>
           </a:xfrm>
           <a:prstGeom prst="line">
@@ -5132,13 +5099,13 @@
       </p:sp>
       <p:sp>
         <p:nvSpPr>
-          <p:cNvPr id="73" name="Shape 73"/>
+          <p:cNvPr id="72" name="Shape 72"/>
           <p:cNvSpPr/>
           <p:nvPr/>
         </p:nvSpPr>
         <p:spPr>
           <a:xfrm flipV="1">
-            <a:off x="3264306" y="9197167"/>
+            <a:off x="3264306" y="9857567"/>
             <a:ext cx="37687026" cy="1"/>
           </a:xfrm>
           <a:prstGeom prst="line">
@@ -5166,13 +5133,13 @@
       </p:sp>
       <p:sp>
         <p:nvSpPr>
-          <p:cNvPr id="74" name="Shape 74"/>
+          <p:cNvPr id="73" name="Shape 73"/>
           <p:cNvSpPr/>
           <p:nvPr/>
         </p:nvSpPr>
         <p:spPr>
           <a:xfrm flipH="1">
-            <a:off x="11578228" y="1313258"/>
+            <a:off x="11546788" y="1109174"/>
             <a:ext cx="1" cy="16366486"/>
           </a:xfrm>
           <a:prstGeom prst="line">
@@ -5200,14 +5167,14 @@
       </p:sp>
       <p:sp>
         <p:nvSpPr>
-          <p:cNvPr id="75" name="Shape 75"/>
+          <p:cNvPr id="74" name="Shape 74"/>
           <p:cNvSpPr/>
           <p:nvPr/>
         </p:nvSpPr>
         <p:spPr>
           <a:xfrm flipH="1">
-            <a:off x="19007958" y="1304791"/>
-            <a:ext cx="1" cy="16383419"/>
+            <a:off x="18976517" y="1100708"/>
+            <a:ext cx="1" cy="16383418"/>
           </a:xfrm>
           <a:prstGeom prst="line">
             <a:avLst/>
@@ -5234,14 +5201,14 @@
       </p:sp>
       <p:sp>
         <p:nvSpPr>
-          <p:cNvPr id="76" name="Shape 76"/>
+          <p:cNvPr id="75" name="Shape 75"/>
           <p:cNvSpPr/>
           <p:nvPr/>
         </p:nvSpPr>
         <p:spPr>
           <a:xfrm flipH="1">
-            <a:off x="26423026" y="1300558"/>
-            <a:ext cx="1" cy="16391885"/>
+            <a:off x="26391586" y="1096474"/>
+            <a:ext cx="1" cy="16391886"/>
           </a:xfrm>
           <a:prstGeom prst="line">
             <a:avLst/>
@@ -5268,14 +5235,14 @@
       </p:sp>
       <p:sp>
         <p:nvSpPr>
-          <p:cNvPr id="77" name="Shape 77"/>
+          <p:cNvPr id="76" name="Shape 76"/>
           <p:cNvSpPr/>
           <p:nvPr/>
         </p:nvSpPr>
         <p:spPr>
           <a:xfrm flipH="1">
-            <a:off x="33834844" y="1296324"/>
-            <a:ext cx="1" cy="16400354"/>
+            <a:off x="33803404" y="1092241"/>
+            <a:ext cx="1" cy="16400353"/>
           </a:xfrm>
           <a:prstGeom prst="line">
             <a:avLst/>
@@ -5302,13 +5269,13 @@
       </p:sp>
       <p:sp>
         <p:nvSpPr>
-          <p:cNvPr id="78" name="Shape 78"/>
+          <p:cNvPr id="77" name="Shape 77"/>
           <p:cNvSpPr/>
           <p:nvPr/>
         </p:nvSpPr>
         <p:spPr>
           <a:xfrm>
-            <a:off x="8055776" y="18924688"/>
+            <a:off x="8004976" y="19229488"/>
             <a:ext cx="1085677" cy="556854"/>
           </a:xfrm>
           <a:prstGeom prst="rect">
@@ -5350,13 +5317,13 @@
       </p:sp>
       <p:sp>
         <p:nvSpPr>
-          <p:cNvPr id="79" name="Shape 79"/>
+          <p:cNvPr id="78" name="Shape 78"/>
           <p:cNvSpPr/>
           <p:nvPr/>
         </p:nvSpPr>
         <p:spPr>
           <a:xfrm>
-            <a:off x="23129961" y="18924688"/>
+            <a:off x="23079161" y="19229488"/>
             <a:ext cx="1085678" cy="556854"/>
           </a:xfrm>
           <a:prstGeom prst="rect">
@@ -5398,13 +5365,13 @@
       </p:sp>
       <p:sp>
         <p:nvSpPr>
-          <p:cNvPr id="80" name="Shape 80"/>
+          <p:cNvPr id="79" name="Shape 79"/>
           <p:cNvSpPr/>
           <p:nvPr/>
         </p:nvSpPr>
         <p:spPr>
           <a:xfrm>
-            <a:off x="36007997" y="18924688"/>
+            <a:off x="35957197" y="19229488"/>
             <a:ext cx="1360736" cy="556854"/>
           </a:xfrm>
           <a:prstGeom prst="rect">

</xml_diff>